<commit_message>
Adiciona usuário e redireciona pra tasks
finalização do fluxo tb
</commit_message>
<xml_diff>
--- a/prototipo/protótipo.pptx
+++ b/prototipo/protótipo.pptx
@@ -217,7 +217,7 @@
             <a:fld id="{FF0B4BD1-6A65-4624-AE16-A4A076CAAAC3}" type="datetimeFigureOut">
               <a:rPr lang="pt-BR" smtClean="0"/>
               <a:pPr/>
-              <a:t>12/02/2013</a:t>
+              <a:t>13/02/2013</a:t>
             </a:fld>
             <a:endParaRPr lang="pt-BR"/>
           </a:p>
@@ -747,7 +747,7 @@
             <a:fld id="{623368D1-AD3D-4611-937E-FE833C099834}" type="datetimeFigureOut">
               <a:rPr lang="pt-BR" smtClean="0"/>
               <a:pPr/>
-              <a:t>12/02/2013</a:t>
+              <a:t>13/02/2013</a:t>
             </a:fld>
             <a:endParaRPr lang="pt-BR"/>
           </a:p>
@@ -914,7 +914,7 @@
             <a:fld id="{623368D1-AD3D-4611-937E-FE833C099834}" type="datetimeFigureOut">
               <a:rPr lang="pt-BR" smtClean="0"/>
               <a:pPr/>
-              <a:t>12/02/2013</a:t>
+              <a:t>13/02/2013</a:t>
             </a:fld>
             <a:endParaRPr lang="pt-BR"/>
           </a:p>
@@ -1091,7 +1091,7 @@
             <a:fld id="{623368D1-AD3D-4611-937E-FE833C099834}" type="datetimeFigureOut">
               <a:rPr lang="pt-BR" smtClean="0"/>
               <a:pPr/>
-              <a:t>12/02/2013</a:t>
+              <a:t>13/02/2013</a:t>
             </a:fld>
             <a:endParaRPr lang="pt-BR"/>
           </a:p>
@@ -1258,7 +1258,7 @@
             <a:fld id="{623368D1-AD3D-4611-937E-FE833C099834}" type="datetimeFigureOut">
               <a:rPr lang="pt-BR" smtClean="0"/>
               <a:pPr/>
-              <a:t>12/02/2013</a:t>
+              <a:t>13/02/2013</a:t>
             </a:fld>
             <a:endParaRPr lang="pt-BR"/>
           </a:p>
@@ -1501,7 +1501,7 @@
             <a:fld id="{623368D1-AD3D-4611-937E-FE833C099834}" type="datetimeFigureOut">
               <a:rPr lang="pt-BR" smtClean="0"/>
               <a:pPr/>
-              <a:t>12/02/2013</a:t>
+              <a:t>13/02/2013</a:t>
             </a:fld>
             <a:endParaRPr lang="pt-BR"/>
           </a:p>
@@ -1786,7 +1786,7 @@
             <a:fld id="{623368D1-AD3D-4611-937E-FE833C099834}" type="datetimeFigureOut">
               <a:rPr lang="pt-BR" smtClean="0"/>
               <a:pPr/>
-              <a:t>12/02/2013</a:t>
+              <a:t>13/02/2013</a:t>
             </a:fld>
             <a:endParaRPr lang="pt-BR"/>
           </a:p>
@@ -2205,7 +2205,7 @@
             <a:fld id="{623368D1-AD3D-4611-937E-FE833C099834}" type="datetimeFigureOut">
               <a:rPr lang="pt-BR" smtClean="0"/>
               <a:pPr/>
-              <a:t>12/02/2013</a:t>
+              <a:t>13/02/2013</a:t>
             </a:fld>
             <a:endParaRPr lang="pt-BR"/>
           </a:p>
@@ -2320,7 +2320,7 @@
             <a:fld id="{623368D1-AD3D-4611-937E-FE833C099834}" type="datetimeFigureOut">
               <a:rPr lang="pt-BR" smtClean="0"/>
               <a:pPr/>
-              <a:t>12/02/2013</a:t>
+              <a:t>13/02/2013</a:t>
             </a:fld>
             <a:endParaRPr lang="pt-BR"/>
           </a:p>
@@ -2412,7 +2412,7 @@
             <a:fld id="{623368D1-AD3D-4611-937E-FE833C099834}" type="datetimeFigureOut">
               <a:rPr lang="pt-BR" smtClean="0"/>
               <a:pPr/>
-              <a:t>12/02/2013</a:t>
+              <a:t>13/02/2013</a:t>
             </a:fld>
             <a:endParaRPr lang="pt-BR"/>
           </a:p>
@@ -2686,7 +2686,7 @@
             <a:fld id="{623368D1-AD3D-4611-937E-FE833C099834}" type="datetimeFigureOut">
               <a:rPr lang="pt-BR" smtClean="0"/>
               <a:pPr/>
-              <a:t>12/02/2013</a:t>
+              <a:t>13/02/2013</a:t>
             </a:fld>
             <a:endParaRPr lang="pt-BR"/>
           </a:p>
@@ -2936,7 +2936,7 @@
             <a:fld id="{623368D1-AD3D-4611-937E-FE833C099834}" type="datetimeFigureOut">
               <a:rPr lang="pt-BR" smtClean="0"/>
               <a:pPr/>
-              <a:t>12/02/2013</a:t>
+              <a:t>13/02/2013</a:t>
             </a:fld>
             <a:endParaRPr lang="pt-BR"/>
           </a:p>
@@ -3155,7 +3155,7 @@
             <a:fld id="{623368D1-AD3D-4611-937E-FE833C099834}" type="datetimeFigureOut">
               <a:rPr lang="pt-BR" smtClean="0"/>
               <a:pPr/>
-              <a:t>12/02/2013</a:t>
+              <a:t>13/02/2013</a:t>
             </a:fld>
             <a:endParaRPr lang="pt-BR"/>
           </a:p>
@@ -4620,15 +4620,7 @@
                   <a:srgbClr val="158AC2"/>
                 </a:solidFill>
               </a:rPr>
-              <a:t>&lt; </a:t>
-            </a:r>
-            <a:r>
-              <a:rPr lang="pt-BR" dirty="0" smtClean="0">
-                <a:solidFill>
-                  <a:srgbClr val="158AC2"/>
-                </a:solidFill>
-              </a:rPr>
-              <a:t>Voltar</a:t>
+              <a:t>&lt; Voltar</a:t>
             </a:r>
             <a:endParaRPr lang="pt-BR" dirty="0">
               <a:solidFill>
@@ -5226,17 +5218,7 @@
                   </a:schemeClr>
                 </a:solidFill>
               </a:rPr>
-              <a:t> tempo</a:t>
-            </a:r>
-            <a:r>
-              <a:rPr lang="pt-BR" sz="2000" dirty="0" smtClean="0">
-                <a:solidFill>
-                  <a:schemeClr val="bg1">
-                    <a:lumMod val="50000"/>
-                  </a:schemeClr>
-                </a:solidFill>
-              </a:rPr>
-              <a:t>. </a:t>
+              <a:t> tempo. </a:t>
             </a:r>
             <a:r>
               <a:rPr lang="pt-BR" sz="2000" dirty="0" err="1" smtClean="0">
@@ -5436,17 +5418,7 @@
                   </a:schemeClr>
                 </a:solidFill>
               </a:rPr>
-              <a:t> tempo</a:t>
-            </a:r>
-            <a:r>
-              <a:rPr lang="pt-BR" sz="2000" dirty="0" smtClean="0">
-                <a:solidFill>
-                  <a:schemeClr val="bg1">
-                    <a:lumMod val="50000"/>
-                  </a:schemeClr>
-                </a:solidFill>
-              </a:rPr>
-              <a:t>. </a:t>
+              <a:t> tempo. </a:t>
             </a:r>
             <a:r>
               <a:rPr lang="pt-BR" sz="2000" dirty="0" err="1" smtClean="0">
@@ -6649,13 +6621,6 @@
               </a:rPr>
               <a:t>25/02/13</a:t>
             </a:r>
-            <a:endParaRPr lang="pt-BR" sz="2000" dirty="0" smtClean="0">
-              <a:solidFill>
-                <a:schemeClr val="bg1">
-                  <a:lumMod val="50000"/>
-                </a:schemeClr>
-              </a:solidFill>
-            </a:endParaRPr>
           </a:p>
         </p:txBody>
       </p:sp>
@@ -6993,13 +6958,6 @@
               </a:rPr>
               <a:t>25/02/13</a:t>
             </a:r>
-            <a:endParaRPr lang="pt-BR" sz="2000" dirty="0" smtClean="0">
-              <a:solidFill>
-                <a:schemeClr val="bg1">
-                  <a:lumMod val="50000"/>
-                </a:schemeClr>
-              </a:solidFill>
-            </a:endParaRPr>
           </a:p>
         </p:txBody>
       </p:sp>
@@ -7039,13 +6997,6 @@
               </a:rPr>
               <a:t>25/02/13</a:t>
             </a:r>
-            <a:endParaRPr lang="pt-BR" sz="2000" dirty="0" smtClean="0">
-              <a:solidFill>
-                <a:schemeClr val="bg1">
-                  <a:lumMod val="50000"/>
-                </a:schemeClr>
-              </a:solidFill>
-            </a:endParaRPr>
           </a:p>
         </p:txBody>
       </p:sp>
@@ -7828,16 +7779,6 @@
               </a:rPr>
               <a:t>25/02/13</a:t>
             </a:r>
-            <a:endParaRPr lang="pt-BR" sz="2000" dirty="0" smtClean="0">
-              <a:solidFill>
-                <a:schemeClr val="accent2">
-                  <a:lumMod val="75000"/>
-                </a:schemeClr>
-              </a:solidFill>
-              <a:latin typeface="+mj-lt"/>
-              <a:ea typeface="+mj-ea"/>
-              <a:cs typeface="+mj-cs"/>
-            </a:endParaRPr>
           </a:p>
         </p:txBody>
       </p:sp>
@@ -8175,13 +8116,6 @@
               </a:rPr>
               <a:t>25/02/13</a:t>
             </a:r>
-            <a:endParaRPr lang="pt-BR" sz="2000" dirty="0" smtClean="0">
-              <a:solidFill>
-                <a:schemeClr val="bg1">
-                  <a:lumMod val="50000"/>
-                </a:schemeClr>
-              </a:solidFill>
-            </a:endParaRPr>
           </a:p>
         </p:txBody>
       </p:sp>
@@ -8221,13 +8155,6 @@
               </a:rPr>
               <a:t>25/02/13</a:t>
             </a:r>
-            <a:endParaRPr lang="pt-BR" sz="2000" dirty="0" smtClean="0">
-              <a:solidFill>
-                <a:schemeClr val="bg1">
-                  <a:lumMod val="50000"/>
-                </a:schemeClr>
-              </a:solidFill>
-            </a:endParaRPr>
           </a:p>
         </p:txBody>
       </p:sp>
@@ -9948,20 +9875,7 @@
                 <a:ea typeface="+mj-ea"/>
                 <a:cs typeface="+mj-cs"/>
               </a:rPr>
-              <a:t>Nova atividade</a:t>
-            </a:r>
-            <a:r>
-              <a:rPr lang="pt-BR" sz="2000" dirty="0" smtClean="0">
-                <a:solidFill>
-                  <a:schemeClr val="bg1">
-                    <a:lumMod val="50000"/>
-                  </a:schemeClr>
-                </a:solidFill>
-                <a:latin typeface="+mj-lt"/>
-                <a:ea typeface="+mj-ea"/>
-                <a:cs typeface="+mj-cs"/>
-              </a:rPr>
-              <a:t>. </a:t>
+              <a:t>Nova atividade. </a:t>
             </a:r>
             <a:endParaRPr lang="pt-BR" sz="2000" dirty="0">
               <a:solidFill>
@@ -10078,20 +9992,7 @@
                 <a:ea typeface="+mj-ea"/>
                 <a:cs typeface="+mj-cs"/>
               </a:rPr>
-              <a:t>Atividade alterada</a:t>
-            </a:r>
-            <a:r>
-              <a:rPr lang="pt-BR" sz="2000" dirty="0" smtClean="0">
-                <a:solidFill>
-                  <a:schemeClr val="bg1">
-                    <a:lumMod val="50000"/>
-                  </a:schemeClr>
-                </a:solidFill>
-                <a:latin typeface="+mj-lt"/>
-                <a:ea typeface="+mj-ea"/>
-                <a:cs typeface="+mj-cs"/>
-              </a:rPr>
-              <a:t>. </a:t>
+              <a:t>Atividade alterada. </a:t>
             </a:r>
             <a:endParaRPr lang="pt-BR" sz="2000" dirty="0">
               <a:solidFill>
@@ -11108,11 +11009,6 @@
               </a:rPr>
               <a:t>Entregas de: Denise</a:t>
             </a:r>
-            <a:endParaRPr lang="pt-BR" sz="2000" dirty="0" smtClean="0">
-              <a:solidFill>
-                <a:srgbClr val="158AC2"/>
-              </a:solidFill>
-            </a:endParaRPr>
           </a:p>
         </p:txBody>
       </p:sp>
@@ -11243,15 +11139,7 @@
                   <a:srgbClr val="158AC2"/>
                 </a:solidFill>
               </a:rPr>
-              <a:t>&lt; </a:t>
-            </a:r>
-            <a:r>
-              <a:rPr lang="pt-BR" dirty="0" smtClean="0">
-                <a:solidFill>
-                  <a:srgbClr val="158AC2"/>
-                </a:solidFill>
-              </a:rPr>
-              <a:t>Voltar</a:t>
+              <a:t>&lt; Voltar</a:t>
             </a:r>
             <a:endParaRPr lang="pt-BR" dirty="0">
               <a:solidFill>
@@ -11819,11 +11707,6 @@
               </a:rPr>
               <a:t>Entregas de: Denise</a:t>
             </a:r>
-            <a:endParaRPr lang="pt-BR" sz="2000" dirty="0" smtClean="0">
-              <a:solidFill>
-                <a:srgbClr val="158AC2"/>
-              </a:solidFill>
-            </a:endParaRPr>
           </a:p>
         </p:txBody>
       </p:sp>
@@ -11954,15 +11837,7 @@
                   <a:srgbClr val="158AC2"/>
                 </a:solidFill>
               </a:rPr>
-              <a:t>&lt; </a:t>
-            </a:r>
-            <a:r>
-              <a:rPr lang="pt-BR" dirty="0" smtClean="0">
-                <a:solidFill>
-                  <a:srgbClr val="158AC2"/>
-                </a:solidFill>
-              </a:rPr>
-              <a:t>Voltar</a:t>
+              <a:t>&lt; Voltar</a:t>
             </a:r>
             <a:endParaRPr lang="pt-BR" dirty="0">
               <a:solidFill>
@@ -12328,17 +12203,7 @@
                   </a:schemeClr>
                 </a:solidFill>
               </a:rPr>
-              <a:t> tempo</a:t>
-            </a:r>
-            <a:r>
-              <a:rPr lang="pt-BR" sz="2000" dirty="0" smtClean="0">
-                <a:solidFill>
-                  <a:schemeClr val="bg1">
-                    <a:lumMod val="50000"/>
-                  </a:schemeClr>
-                </a:solidFill>
-              </a:rPr>
-              <a:t>. </a:t>
+              <a:t> tempo. </a:t>
             </a:r>
             <a:r>
               <a:rPr lang="pt-BR" sz="2000" dirty="0" err="1" smtClean="0">
@@ -12538,17 +12403,7 @@
                   </a:schemeClr>
                 </a:solidFill>
               </a:rPr>
-              <a:t> tempo</a:t>
-            </a:r>
-            <a:r>
-              <a:rPr lang="pt-BR" sz="2000" dirty="0" smtClean="0">
-                <a:solidFill>
-                  <a:schemeClr val="bg1">
-                    <a:lumMod val="50000"/>
-                  </a:schemeClr>
-                </a:solidFill>
-              </a:rPr>
-              <a:t>. </a:t>
+              <a:t> tempo. </a:t>
             </a:r>
             <a:r>
               <a:rPr lang="pt-BR" sz="2000" dirty="0" err="1" smtClean="0">
@@ -13535,15 +13390,7 @@
                   <a:srgbClr val="158AC2"/>
                 </a:solidFill>
               </a:rPr>
-              <a:t>&lt; </a:t>
-            </a:r>
-            <a:r>
-              <a:rPr lang="pt-BR" dirty="0" smtClean="0">
-                <a:solidFill>
-                  <a:srgbClr val="158AC2"/>
-                </a:solidFill>
-              </a:rPr>
-              <a:t>Voltar</a:t>
+              <a:t>&lt; Voltar</a:t>
             </a:r>
             <a:endParaRPr lang="pt-BR" dirty="0">
               <a:solidFill>
@@ -13926,17 +13773,7 @@
                   </a:schemeClr>
                 </a:solidFill>
               </a:rPr>
-              <a:t> tempo</a:t>
-            </a:r>
-            <a:r>
-              <a:rPr lang="pt-BR" sz="2000" dirty="0" smtClean="0">
-                <a:solidFill>
-                  <a:schemeClr val="bg1">
-                    <a:lumMod val="50000"/>
-                  </a:schemeClr>
-                </a:solidFill>
-              </a:rPr>
-              <a:t>. </a:t>
+              <a:t> tempo. </a:t>
             </a:r>
             <a:r>
               <a:rPr lang="pt-BR" sz="2000" dirty="0" err="1" smtClean="0">
@@ -14136,17 +13973,7 @@
                   </a:schemeClr>
                 </a:solidFill>
               </a:rPr>
-              <a:t> tempo</a:t>
-            </a:r>
-            <a:r>
-              <a:rPr lang="pt-BR" sz="2000" dirty="0" smtClean="0">
-                <a:solidFill>
-                  <a:schemeClr val="bg1">
-                    <a:lumMod val="50000"/>
-                  </a:schemeClr>
-                </a:solidFill>
-              </a:rPr>
-              <a:t>. </a:t>
+              <a:t> tempo. </a:t>
             </a:r>
             <a:r>
               <a:rPr lang="pt-BR" sz="2000" dirty="0" err="1" smtClean="0">
@@ -14653,11 +14480,6 @@
               </a:rPr>
               <a:t>Entregas de: Denise</a:t>
             </a:r>
-            <a:endParaRPr lang="pt-BR" sz="2000" dirty="0" smtClean="0">
-              <a:solidFill>
-                <a:srgbClr val="158AC2"/>
-              </a:solidFill>
-            </a:endParaRPr>
           </a:p>
         </p:txBody>
       </p:sp>
@@ -15315,7 +15137,9 @@
             <a:avLst/>
           </a:prstGeom>
           <a:solidFill>
-            <a:srgbClr val="C00000"/>
+            <a:schemeClr val="accent3">
+              <a:lumMod val="75000"/>
+            </a:schemeClr>
           </a:solidFill>
           <a:ln>
             <a:noFill/>
@@ -15556,7 +15380,9 @@
             <a:avLst/>
           </a:prstGeom>
           <a:solidFill>
-            <a:srgbClr val="C00000"/>
+            <a:schemeClr val="accent3">
+              <a:lumMod val="75000"/>
+            </a:schemeClr>
           </a:solidFill>
           <a:ln>
             <a:noFill/>
@@ -16155,20 +15981,7 @@
                 <a:ea typeface="+mj-ea"/>
                 <a:cs typeface="+mj-cs"/>
               </a:rPr>
-              <a:t>23</a:t>
-            </a:r>
-            <a:r>
-              <a:rPr lang="pt-BR" sz="2000" dirty="0" smtClean="0">
-                <a:solidFill>
-                  <a:schemeClr val="bg1">
-                    <a:lumMod val="50000"/>
-                  </a:schemeClr>
-                </a:solidFill>
-                <a:latin typeface="+mj-lt"/>
-                <a:ea typeface="+mj-ea"/>
-                <a:cs typeface="+mj-cs"/>
-              </a:rPr>
-              <a:t> entregas</a:t>
+              <a:t>23 entregas</a:t>
             </a:r>
             <a:endParaRPr lang="pt-BR" sz="2000" dirty="0">
               <a:solidFill>
@@ -16510,6 +16323,56 @@
           </p:spPr>
         </p:pic>
       </p:grpSp>
+      <p:sp>
+        <p:nvSpPr>
+          <p:cNvPr id="37" name="Retângulo de cantos arredondados 36"/>
+          <p:cNvSpPr/>
+          <p:nvPr/>
+        </p:nvSpPr>
+        <p:spPr>
+          <a:xfrm>
+            <a:off x="1763688" y="2996952"/>
+            <a:ext cx="360040" cy="216024"/>
+          </a:xfrm>
+          <a:prstGeom prst="roundRect">
+            <a:avLst/>
+          </a:prstGeom>
+          <a:solidFill>
+            <a:srgbClr val="CF5C3D"/>
+          </a:solidFill>
+          <a:ln>
+            <a:noFill/>
+          </a:ln>
+        </p:spPr>
+        <p:style>
+          <a:lnRef idx="2">
+            <a:schemeClr val="accent1">
+              <a:shade val="50000"/>
+            </a:schemeClr>
+          </a:lnRef>
+          <a:fillRef idx="1">
+            <a:schemeClr val="accent1"/>
+          </a:fillRef>
+          <a:effectRef idx="0">
+            <a:schemeClr val="accent1"/>
+          </a:effectRef>
+          <a:fontRef idx="minor">
+            <a:schemeClr val="lt1"/>
+          </a:fontRef>
+        </p:style>
+        <p:txBody>
+          <a:bodyPr rtlCol="0" anchor="ctr"/>
+          <a:lstStyle/>
+          <a:p>
+            <a:pPr algn="ctr"/>
+            <a:r>
+              <a:rPr lang="pt-BR" dirty="0" smtClean="0"/>
+              <a:t>3</a:t>
+            </a:r>
+            <a:endParaRPr lang="pt-BR" dirty="0"/>
+          </a:p>
+        </p:txBody>
+      </p:sp>
     </p:spTree>
   </p:cSld>
   <p:clrMapOvr>
@@ -16634,11 +16497,6 @@
               </a:rPr>
               <a:t>Denise Jaeger</a:t>
             </a:r>
-            <a:endParaRPr lang="pt-BR" sz="2000" dirty="0" smtClean="0">
-              <a:solidFill>
-                <a:srgbClr val="158AC2"/>
-              </a:solidFill>
-            </a:endParaRPr>
           </a:p>
         </p:txBody>
       </p:sp>
@@ -16700,15 +16558,7 @@
                   <a:srgbClr val="158AC2"/>
                 </a:solidFill>
               </a:rPr>
-              <a:t>&lt; </a:t>
-            </a:r>
-            <a:r>
-              <a:rPr lang="pt-BR" dirty="0" smtClean="0">
-                <a:solidFill>
-                  <a:srgbClr val="158AC2"/>
-                </a:solidFill>
-              </a:rPr>
-              <a:t>Voltar</a:t>
+              <a:t>&lt; Voltar</a:t>
             </a:r>
             <a:endParaRPr lang="pt-BR" dirty="0">
               <a:solidFill>
@@ -16752,11 +16602,6 @@
               </a:rPr>
               <a:t>Fulano</a:t>
             </a:r>
-            <a:endParaRPr lang="pt-BR" sz="2000" dirty="0" smtClean="0">
-              <a:solidFill>
-                <a:srgbClr val="158AC2"/>
-              </a:solidFill>
-            </a:endParaRPr>
           </a:p>
         </p:txBody>
       </p:sp>
@@ -16826,11 +16671,6 @@
               </a:rPr>
               <a:t>Fulano</a:t>
             </a:r>
-            <a:endParaRPr lang="pt-BR" sz="2000" dirty="0" smtClean="0">
-              <a:solidFill>
-                <a:srgbClr val="158AC2"/>
-              </a:solidFill>
-            </a:endParaRPr>
           </a:p>
         </p:txBody>
       </p:sp>
@@ -16868,11 +16708,6 @@
               </a:rPr>
               <a:t>Fulano</a:t>
             </a:r>
-            <a:endParaRPr lang="pt-BR" sz="2000" dirty="0" smtClean="0">
-              <a:solidFill>
-                <a:srgbClr val="158AC2"/>
-              </a:solidFill>
-            </a:endParaRPr>
           </a:p>
         </p:txBody>
       </p:sp>
@@ -16942,11 +16777,6 @@
               </a:rPr>
               <a:t>Fulano</a:t>
             </a:r>
-            <a:endParaRPr lang="pt-BR" sz="2000" dirty="0" smtClean="0">
-              <a:solidFill>
-                <a:srgbClr val="158AC2"/>
-              </a:solidFill>
-            </a:endParaRPr>
           </a:p>
         </p:txBody>
       </p:sp>
@@ -16984,11 +16814,6 @@
               </a:rPr>
               <a:t>Fulano</a:t>
             </a:r>
-            <a:endParaRPr lang="pt-BR" sz="2000" dirty="0" smtClean="0">
-              <a:solidFill>
-                <a:srgbClr val="158AC2"/>
-              </a:solidFill>
-            </a:endParaRPr>
           </a:p>
         </p:txBody>
       </p:sp>
@@ -17323,15 +17148,7 @@
                   <a:srgbClr val="158AC2"/>
                 </a:solidFill>
               </a:rPr>
-              <a:t>Entregas de: Atividade </a:t>
-            </a:r>
-            <a:r>
-              <a:rPr lang="pt-BR" sz="2000" dirty="0" smtClean="0">
-                <a:solidFill>
-                  <a:srgbClr val="158AC2"/>
-                </a:solidFill>
-              </a:rPr>
-              <a:t>Complementar I</a:t>
+              <a:t>Entregas de: Atividade Complementar I</a:t>
             </a:r>
           </a:p>
         </p:txBody>
@@ -17592,11 +17409,6 @@
               </a:rPr>
               <a:t>Denise Jaeger</a:t>
             </a:r>
-            <a:endParaRPr lang="pt-BR" sz="2000" dirty="0" smtClean="0">
-              <a:solidFill>
-                <a:srgbClr val="158AC2"/>
-              </a:solidFill>
-            </a:endParaRPr>
           </a:p>
         </p:txBody>
       </p:sp>
@@ -17632,15 +17444,7 @@
                   <a:srgbClr val="158AC2"/>
                 </a:solidFill>
               </a:rPr>
-              <a:t>&lt; </a:t>
-            </a:r>
-            <a:r>
-              <a:rPr lang="pt-BR" dirty="0" smtClean="0">
-                <a:solidFill>
-                  <a:srgbClr val="158AC2"/>
-                </a:solidFill>
-              </a:rPr>
-              <a:t>Voltar</a:t>
+              <a:t>&lt; Voltar</a:t>
             </a:r>
             <a:endParaRPr lang="pt-BR" dirty="0">
               <a:solidFill>
@@ -17684,11 +17488,6 @@
               </a:rPr>
               <a:t>Fulano</a:t>
             </a:r>
-            <a:endParaRPr lang="pt-BR" sz="2000" dirty="0" smtClean="0">
-              <a:solidFill>
-                <a:srgbClr val="158AC2"/>
-              </a:solidFill>
-            </a:endParaRPr>
           </a:p>
         </p:txBody>
       </p:sp>
@@ -17758,11 +17557,6 @@
               </a:rPr>
               <a:t>Fulano</a:t>
             </a:r>
-            <a:endParaRPr lang="pt-BR" sz="2000" dirty="0" smtClean="0">
-              <a:solidFill>
-                <a:srgbClr val="158AC2"/>
-              </a:solidFill>
-            </a:endParaRPr>
           </a:p>
         </p:txBody>
       </p:sp>
@@ -17800,11 +17594,6 @@
               </a:rPr>
               <a:t>Fulano</a:t>
             </a:r>
-            <a:endParaRPr lang="pt-BR" sz="2000" dirty="0" smtClean="0">
-              <a:solidFill>
-                <a:srgbClr val="158AC2"/>
-              </a:solidFill>
-            </a:endParaRPr>
           </a:p>
         </p:txBody>
       </p:sp>
@@ -17874,11 +17663,6 @@
               </a:rPr>
               <a:t>Fulano</a:t>
             </a:r>
-            <a:endParaRPr lang="pt-BR" sz="2000" dirty="0" smtClean="0">
-              <a:solidFill>
-                <a:srgbClr val="158AC2"/>
-              </a:solidFill>
-            </a:endParaRPr>
           </a:p>
         </p:txBody>
       </p:sp>
@@ -17916,11 +17700,6 @@
               </a:rPr>
               <a:t>Fulano</a:t>
             </a:r>
-            <a:endParaRPr lang="pt-BR" sz="2000" dirty="0" smtClean="0">
-              <a:solidFill>
-                <a:srgbClr val="158AC2"/>
-              </a:solidFill>
-            </a:endParaRPr>
           </a:p>
         </p:txBody>
       </p:sp>
@@ -18228,15 +18007,7 @@
                   <a:srgbClr val="158AC2"/>
                 </a:solidFill>
               </a:rPr>
-              <a:t>Entregas de: Atividade </a:t>
-            </a:r>
-            <a:r>
-              <a:rPr lang="pt-BR" sz="2000" dirty="0" smtClean="0">
-                <a:solidFill>
-                  <a:srgbClr val="158AC2"/>
-                </a:solidFill>
-              </a:rPr>
-              <a:t>Complementar I</a:t>
+              <a:t>Entregas de: Atividade Complementar I</a:t>
             </a:r>
           </a:p>
         </p:txBody>
@@ -18451,11 +18222,6 @@
               </a:rPr>
               <a:t>Denise Jaeger</a:t>
             </a:r>
-            <a:endParaRPr lang="pt-BR" sz="2000" dirty="0" smtClean="0">
-              <a:solidFill>
-                <a:srgbClr val="158AC2"/>
-              </a:solidFill>
-            </a:endParaRPr>
           </a:p>
         </p:txBody>
       </p:sp>
@@ -18493,11 +18259,6 @@
               </a:rPr>
               <a:t>Fulano</a:t>
             </a:r>
-            <a:endParaRPr lang="pt-BR" sz="2000" dirty="0" smtClean="0">
-              <a:solidFill>
-                <a:srgbClr val="158AC2"/>
-              </a:solidFill>
-            </a:endParaRPr>
           </a:p>
         </p:txBody>
       </p:sp>
@@ -18567,11 +18328,6 @@
               </a:rPr>
               <a:t>Fulano</a:t>
             </a:r>
-            <a:endParaRPr lang="pt-BR" sz="2000" dirty="0" smtClean="0">
-              <a:solidFill>
-                <a:srgbClr val="158AC2"/>
-              </a:solidFill>
-            </a:endParaRPr>
           </a:p>
         </p:txBody>
       </p:sp>
@@ -18609,11 +18365,6 @@
               </a:rPr>
               <a:t>Fulano</a:t>
             </a:r>
-            <a:endParaRPr lang="pt-BR" sz="2000" dirty="0" smtClean="0">
-              <a:solidFill>
-                <a:srgbClr val="158AC2"/>
-              </a:solidFill>
-            </a:endParaRPr>
           </a:p>
         </p:txBody>
       </p:sp>
@@ -18683,11 +18434,6 @@
               </a:rPr>
               <a:t>Fulano</a:t>
             </a:r>
-            <a:endParaRPr lang="pt-BR" sz="2000" dirty="0" smtClean="0">
-              <a:solidFill>
-                <a:srgbClr val="158AC2"/>
-              </a:solidFill>
-            </a:endParaRPr>
           </a:p>
         </p:txBody>
       </p:sp>
@@ -18725,11 +18471,6 @@
               </a:rPr>
               <a:t>Fulano</a:t>
             </a:r>
-            <a:endParaRPr lang="pt-BR" sz="2000" dirty="0" smtClean="0">
-              <a:solidFill>
-                <a:srgbClr val="158AC2"/>
-              </a:solidFill>
-            </a:endParaRPr>
           </a:p>
         </p:txBody>
       </p:sp>
@@ -19529,15 +19270,7 @@
                   <a:srgbClr val="158AC2"/>
                 </a:solidFill>
               </a:rPr>
-              <a:t>Entregas de: Atividade </a:t>
-            </a:r>
-            <a:r>
-              <a:rPr lang="pt-BR" sz="2000" dirty="0" smtClean="0">
-                <a:solidFill>
-                  <a:srgbClr val="158AC2"/>
-                </a:solidFill>
-              </a:rPr>
-              <a:t>Complementar I</a:t>
+              <a:t>Entregas de: Atividade Complementar I</a:t>
             </a:r>
           </a:p>
         </p:txBody>
@@ -19799,11 +19532,6 @@
               </a:rPr>
               <a:t>Denise Jaeger</a:t>
             </a:r>
-            <a:endParaRPr lang="pt-BR" sz="2000" dirty="0" smtClean="0">
-              <a:solidFill>
-                <a:srgbClr val="158AC2"/>
-              </a:solidFill>
-            </a:endParaRPr>
           </a:p>
         </p:txBody>
       </p:sp>
@@ -19839,15 +19567,7 @@
                   <a:srgbClr val="158AC2"/>
                 </a:solidFill>
               </a:rPr>
-              <a:t>&lt; </a:t>
-            </a:r>
-            <a:r>
-              <a:rPr lang="pt-BR" dirty="0" smtClean="0">
-                <a:solidFill>
-                  <a:srgbClr val="158AC2"/>
-                </a:solidFill>
-              </a:rPr>
-              <a:t>Voltar</a:t>
+              <a:t>&lt; Voltar</a:t>
             </a:r>
             <a:endParaRPr lang="pt-BR" dirty="0">
               <a:solidFill>
@@ -19891,11 +19611,6 @@
               </a:rPr>
               <a:t>Fulano</a:t>
             </a:r>
-            <a:endParaRPr lang="pt-BR" sz="2000" dirty="0" smtClean="0">
-              <a:solidFill>
-                <a:srgbClr val="158AC2"/>
-              </a:solidFill>
-            </a:endParaRPr>
           </a:p>
         </p:txBody>
       </p:sp>
@@ -19965,11 +19680,6 @@
               </a:rPr>
               <a:t>Fulano</a:t>
             </a:r>
-            <a:endParaRPr lang="pt-BR" sz="2000" dirty="0" smtClean="0">
-              <a:solidFill>
-                <a:srgbClr val="158AC2"/>
-              </a:solidFill>
-            </a:endParaRPr>
           </a:p>
         </p:txBody>
       </p:sp>
@@ -20007,11 +19717,6 @@
               </a:rPr>
               <a:t>Fulano</a:t>
             </a:r>
-            <a:endParaRPr lang="pt-BR" sz="2000" dirty="0" smtClean="0">
-              <a:solidFill>
-                <a:srgbClr val="158AC2"/>
-              </a:solidFill>
-            </a:endParaRPr>
           </a:p>
         </p:txBody>
       </p:sp>
@@ -20081,11 +19786,6 @@
               </a:rPr>
               <a:t>Fulano</a:t>
             </a:r>
-            <a:endParaRPr lang="pt-BR" sz="2000" dirty="0" smtClean="0">
-              <a:solidFill>
-                <a:srgbClr val="158AC2"/>
-              </a:solidFill>
-            </a:endParaRPr>
           </a:p>
         </p:txBody>
       </p:sp>
@@ -20123,11 +19823,6 @@
               </a:rPr>
               <a:t>Fulano</a:t>
             </a:r>
-            <a:endParaRPr lang="pt-BR" sz="2000" dirty="0" smtClean="0">
-              <a:solidFill>
-                <a:srgbClr val="158AC2"/>
-              </a:solidFill>
-            </a:endParaRPr>
           </a:p>
         </p:txBody>
       </p:sp>
@@ -20435,15 +20130,7 @@
                   <a:srgbClr val="158AC2"/>
                 </a:solidFill>
               </a:rPr>
-              <a:t>Entregas de: Atividade </a:t>
-            </a:r>
-            <a:r>
-              <a:rPr lang="pt-BR" sz="2000" dirty="0" smtClean="0">
-                <a:solidFill>
-                  <a:srgbClr val="158AC2"/>
-                </a:solidFill>
-              </a:rPr>
-              <a:t>Complementar I</a:t>
+              <a:t>Entregas de: Atividade Complementar I</a:t>
             </a:r>
           </a:p>
         </p:txBody>
@@ -20624,15 +20311,7 @@
                   <a:srgbClr val="158AC2"/>
                 </a:solidFill>
               </a:rPr>
-              <a:t>Editar: Atividade </a:t>
-            </a:r>
-            <a:r>
-              <a:rPr lang="pt-BR" sz="2000" dirty="0" smtClean="0">
-                <a:solidFill>
-                  <a:srgbClr val="158AC2"/>
-                </a:solidFill>
-              </a:rPr>
-              <a:t>Complementar I</a:t>
+              <a:t>Editar: Atividade Complementar I</a:t>
             </a:r>
           </a:p>
         </p:txBody>
@@ -20881,25 +20560,8 @@
                   </a:schemeClr>
                 </a:solidFill>
               </a:rPr>
-              <a:t>Atividade Complementar </a:t>
-            </a:r>
-            <a:r>
-              <a:rPr lang="pt-BR" dirty="0" smtClean="0">
-                <a:solidFill>
-                  <a:schemeClr val="bg1">
-                    <a:lumMod val="50000"/>
-                  </a:schemeClr>
-                </a:solidFill>
-              </a:rPr>
-              <a:t>I</a:t>
-            </a:r>
-            <a:endParaRPr lang="pt-BR" dirty="0" smtClean="0">
-              <a:solidFill>
-                <a:schemeClr val="bg1">
-                  <a:lumMod val="50000"/>
-                </a:schemeClr>
-              </a:solidFill>
-            </a:endParaRPr>
+              <a:t>Atividade Complementar I</a:t>
+            </a:r>
           </a:p>
         </p:txBody>
       </p:sp>
@@ -21011,25 +20673,8 @@
                   </a:schemeClr>
                 </a:solidFill>
               </a:rPr>
-              <a:t>Atividade Complementar </a:t>
-            </a:r>
-            <a:r>
-              <a:rPr lang="pt-BR" dirty="0" smtClean="0">
-                <a:solidFill>
-                  <a:schemeClr val="bg1">
-                    <a:lumMod val="50000"/>
-                  </a:schemeClr>
-                </a:solidFill>
-              </a:rPr>
-              <a:t>I</a:t>
-            </a:r>
-            <a:endParaRPr lang="pt-BR" dirty="0" smtClean="0">
-              <a:solidFill>
-                <a:schemeClr val="bg1">
-                  <a:lumMod val="50000"/>
-                </a:schemeClr>
-              </a:solidFill>
-            </a:endParaRPr>
+              <a:t>Atividade Complementar I</a:t>
+            </a:r>
           </a:p>
         </p:txBody>
       </p:sp>
@@ -21143,13 +20788,6 @@
               </a:rPr>
               <a:t>25/02/2013</a:t>
             </a:r>
-            <a:endParaRPr lang="pt-BR" dirty="0" smtClean="0">
-              <a:solidFill>
-                <a:schemeClr val="bg1">
-                  <a:lumMod val="50000"/>
-                </a:schemeClr>
-              </a:solidFill>
-            </a:endParaRPr>
           </a:p>
         </p:txBody>
       </p:sp>
@@ -21213,27 +20851,7 @@
                   </a:schemeClr>
                 </a:solidFill>
               </a:rPr>
-              <a:t>Bloquear </a:t>
-            </a:r>
-            <a:r>
-              <a:rPr lang="pt-BR" sz="2000" dirty="0" smtClean="0">
-                <a:solidFill>
-                  <a:schemeClr val="bg1">
-                    <a:lumMod val="50000"/>
-                  </a:schemeClr>
-                </a:solidFill>
-              </a:rPr>
-              <a:t>automaticamente:</a:t>
-            </a:r>
-            <a:r>
-              <a:rPr lang="pt-BR" sz="2000" dirty="0" smtClean="0">
-                <a:solidFill>
-                  <a:schemeClr val="bg1">
-                    <a:lumMod val="50000"/>
-                  </a:schemeClr>
-                </a:solidFill>
-              </a:rPr>
-              <a:t> </a:t>
+              <a:t>Bloquear automaticamente: </a:t>
             </a:r>
             <a:endParaRPr lang="pt-BR" sz="2000" dirty="0">
               <a:solidFill>
@@ -21309,13 +20927,6 @@
               </a:rPr>
               <a:t>20:00</a:t>
             </a:r>
-            <a:endParaRPr lang="pt-BR" dirty="0" smtClean="0">
-              <a:solidFill>
-                <a:schemeClr val="bg1">
-                  <a:lumMod val="50000"/>
-                </a:schemeClr>
-              </a:solidFill>
-            </a:endParaRPr>
           </a:p>
         </p:txBody>
       </p:sp>
@@ -21713,27 +21324,7 @@
                   </a:schemeClr>
                 </a:solidFill>
               </a:rPr>
-              <a:t>Status</a:t>
-            </a:r>
-            <a:r>
-              <a:rPr lang="pt-BR" sz="2000" dirty="0" smtClean="0">
-                <a:solidFill>
-                  <a:schemeClr val="bg1">
-                    <a:lumMod val="50000"/>
-                  </a:schemeClr>
-                </a:solidFill>
-              </a:rPr>
-              <a:t>:</a:t>
-            </a:r>
-            <a:r>
-              <a:rPr lang="pt-BR" sz="2000" dirty="0" smtClean="0">
-                <a:solidFill>
-                  <a:schemeClr val="bg1">
-                    <a:lumMod val="50000"/>
-                  </a:schemeClr>
-                </a:solidFill>
-              </a:rPr>
-              <a:t> </a:t>
+              <a:t>Status: </a:t>
             </a:r>
             <a:endParaRPr lang="pt-BR" sz="2000" dirty="0">
               <a:solidFill>
@@ -30012,15 +29603,7 @@
                   <a:srgbClr val="158AC2"/>
                 </a:solidFill>
               </a:rPr>
-              <a:t>&lt; </a:t>
-            </a:r>
-            <a:r>
-              <a:rPr lang="pt-BR" dirty="0" smtClean="0">
-                <a:solidFill>
-                  <a:srgbClr val="158AC2"/>
-                </a:solidFill>
-              </a:rPr>
-              <a:t>Voltar</a:t>
+              <a:t>&lt; Voltar</a:t>
             </a:r>
             <a:endParaRPr lang="pt-BR" dirty="0">
               <a:solidFill>

</xml_diff>